<commit_message>
made changes to doc
</commit_message>
<xml_diff>
--- a/Neighborhoods-Bangalore-Presentation.pptx
+++ b/Neighborhoods-Bangalore-Presentation.pptx
@@ -157,7 +157,7 @@
           <p:cNvPr id="2" name="Text Placeholder 9">
             <a:extLst>
               <a:ext uri="{FF2B5EF4-FFF2-40B4-BE49-F238E27FC236}">
-                <a16:creationId xmlns:a16="http://schemas.microsoft.com/office/drawing/2014/main" xmlns="" id="{23DE32A5-6181-4C51-AD5C-3F1A448478A1}"/>
+                <a16:creationId xmlns="" xmlns:a16="http://schemas.microsoft.com/office/drawing/2014/main" id="{23DE32A5-6181-4C51-AD5C-3F1A448478A1}"/>
               </a:ext>
             </a:extLst>
           </p:cNvPr>
@@ -246,7 +246,7 @@
           <p:cNvPr id="2" name="그림 개체 틀 2">
             <a:extLst>
               <a:ext uri="{FF2B5EF4-FFF2-40B4-BE49-F238E27FC236}">
-                <a16:creationId xmlns:a16="http://schemas.microsoft.com/office/drawing/2014/main" xmlns="" id="{5554FB4E-E79F-4FCD-B373-1990A7E51642}"/>
+                <a16:creationId xmlns="" xmlns:a16="http://schemas.microsoft.com/office/drawing/2014/main" id="{5554FB4E-E79F-4FCD-B373-1990A7E51642}"/>
               </a:ext>
             </a:extLst>
           </p:cNvPr>
@@ -936,7 +936,7 @@
           <p:cNvPr id="58" name="TextBox 57">
             <a:extLst>
               <a:ext uri="{FF2B5EF4-FFF2-40B4-BE49-F238E27FC236}">
-                <a16:creationId xmlns:a16="http://schemas.microsoft.com/office/drawing/2014/main" xmlns="" id="{5644E8BB-F13A-4AE0-889E-633DE4143787}"/>
+                <a16:creationId xmlns="" xmlns:a16="http://schemas.microsoft.com/office/drawing/2014/main" id="{5644E8BB-F13A-4AE0-889E-633DE4143787}"/>
               </a:ext>
             </a:extLst>
           </p:cNvPr>
@@ -984,7 +984,7 @@
           <p:cNvPr id="59" name="TextBox 58">
             <a:extLst>
               <a:ext uri="{FF2B5EF4-FFF2-40B4-BE49-F238E27FC236}">
-                <a16:creationId xmlns:a16="http://schemas.microsoft.com/office/drawing/2014/main" xmlns="" id="{F2CE2B8B-ED32-491A-95B2-D28904BC432C}"/>
+                <a16:creationId xmlns="" xmlns:a16="http://schemas.microsoft.com/office/drawing/2014/main" id="{F2CE2B8B-ED32-491A-95B2-D28904BC432C}"/>
               </a:ext>
             </a:extLst>
           </p:cNvPr>
@@ -1044,7 +1044,7 @@
           <p:cNvPr id="60" name="TextBox 59">
             <a:extLst>
               <a:ext uri="{FF2B5EF4-FFF2-40B4-BE49-F238E27FC236}">
-                <a16:creationId xmlns:a16="http://schemas.microsoft.com/office/drawing/2014/main" xmlns="" id="{962A52DF-2523-4479-BFA3-B5ACE9887E1C}"/>
+                <a16:creationId xmlns="" xmlns:a16="http://schemas.microsoft.com/office/drawing/2014/main" id="{962A52DF-2523-4479-BFA3-B5ACE9887E1C}"/>
               </a:ext>
             </a:extLst>
           </p:cNvPr>
@@ -1092,7 +1092,7 @@
           <p:cNvPr id="61" name="TextBox 60">
             <a:extLst>
               <a:ext uri="{FF2B5EF4-FFF2-40B4-BE49-F238E27FC236}">
-                <a16:creationId xmlns:a16="http://schemas.microsoft.com/office/drawing/2014/main" xmlns="" id="{BAAC314F-E96A-4408-95DE-A70E9ED054AF}"/>
+                <a16:creationId xmlns="" xmlns:a16="http://schemas.microsoft.com/office/drawing/2014/main" id="{BAAC314F-E96A-4408-95DE-A70E9ED054AF}"/>
               </a:ext>
             </a:extLst>
           </p:cNvPr>
@@ -1221,7 +1221,7 @@
           <p:cNvPr id="2" name="Text Placeholder 9">
             <a:extLst>
               <a:ext uri="{FF2B5EF4-FFF2-40B4-BE49-F238E27FC236}">
-                <a16:creationId xmlns:a16="http://schemas.microsoft.com/office/drawing/2014/main" xmlns="" id="{23DE32A5-6181-4C51-AD5C-3F1A448478A1}"/>
+                <a16:creationId xmlns="" xmlns:a16="http://schemas.microsoft.com/office/drawing/2014/main" id="{23DE32A5-6181-4C51-AD5C-3F1A448478A1}"/>
               </a:ext>
             </a:extLst>
           </p:cNvPr>
@@ -1376,7 +1376,7 @@
           <p:cNvPr id="2" name="Rectangle 1">
             <a:extLst>
               <a:ext uri="{FF2B5EF4-FFF2-40B4-BE49-F238E27FC236}">
-                <a16:creationId xmlns:a16="http://schemas.microsoft.com/office/drawing/2014/main" xmlns="" id="{321DB724-9006-424E-A191-C08CB17EE2CA}"/>
+                <a16:creationId xmlns="" xmlns:a16="http://schemas.microsoft.com/office/drawing/2014/main" id="{321DB724-9006-424E-A191-C08CB17EE2CA}"/>
               </a:ext>
             </a:extLst>
           </p:cNvPr>
@@ -1425,7 +1425,7 @@
           <p:cNvPr id="4" name="그림 개체 틀 2">
             <a:extLst>
               <a:ext uri="{FF2B5EF4-FFF2-40B4-BE49-F238E27FC236}">
-                <a16:creationId xmlns:a16="http://schemas.microsoft.com/office/drawing/2014/main" xmlns="" id="{13FB2FD4-D355-49C8-B7E0-BC49131F2FEA}"/>
+                <a16:creationId xmlns="" xmlns:a16="http://schemas.microsoft.com/office/drawing/2014/main" id="{13FB2FD4-D355-49C8-B7E0-BC49131F2FEA}"/>
               </a:ext>
             </a:extLst>
           </p:cNvPr>
@@ -1510,7 +1510,7 @@
           <p:cNvPr id="2" name="그림 1">
             <a:extLst>
               <a:ext uri="{FF2B5EF4-FFF2-40B4-BE49-F238E27FC236}">
-                <a16:creationId xmlns:a16="http://schemas.microsoft.com/office/drawing/2014/main" xmlns="" id="{54BAF68A-9D51-4222-8013-E9B5F820985D}"/>
+                <a16:creationId xmlns="" xmlns:a16="http://schemas.microsoft.com/office/drawing/2014/main" id="{54BAF68A-9D51-4222-8013-E9B5F820985D}"/>
               </a:ext>
             </a:extLst>
           </p:cNvPr>
@@ -1546,7 +1546,7 @@
           <p:cNvPr id="3" name="Picture 3" descr="E:\002-KIMS BUSINESS\007-02-MaxPPT-Contents\150902-com-Global-Laptop\mo900.png">
             <a:extLst>
               <a:ext uri="{FF2B5EF4-FFF2-40B4-BE49-F238E27FC236}">
-                <a16:creationId xmlns:a16="http://schemas.microsoft.com/office/drawing/2014/main" xmlns="" id="{1C4F8B41-3F98-4240-8891-4ADABC669A41}"/>
+                <a16:creationId xmlns="" xmlns:a16="http://schemas.microsoft.com/office/drawing/2014/main" id="{1C4F8B41-3F98-4240-8891-4ADABC669A41}"/>
               </a:ext>
             </a:extLst>
           </p:cNvPr>
@@ -1600,7 +1600,7 @@
           <p:cNvPr id="4" name="Picture Placeholder 2">
             <a:extLst>
               <a:ext uri="{FF2B5EF4-FFF2-40B4-BE49-F238E27FC236}">
-                <a16:creationId xmlns:a16="http://schemas.microsoft.com/office/drawing/2014/main" xmlns="" id="{88CB46E1-8EB0-4782-9CDE-623B6BC6877B}"/>
+                <a16:creationId xmlns="" xmlns:a16="http://schemas.microsoft.com/office/drawing/2014/main" id="{88CB46E1-8EB0-4782-9CDE-623B6BC6877B}"/>
               </a:ext>
             </a:extLst>
           </p:cNvPr>
@@ -1803,7 +1803,7 @@
           <p:cNvPr id="5" name="Text Placeholder 9">
             <a:extLst>
               <a:ext uri="{FF2B5EF4-FFF2-40B4-BE49-F238E27FC236}">
-                <a16:creationId xmlns:a16="http://schemas.microsoft.com/office/drawing/2014/main" xmlns="" id="{388CF590-A7AC-47AA-9D77-5FF843A9CEE8}"/>
+                <a16:creationId xmlns="" xmlns:a16="http://schemas.microsoft.com/office/drawing/2014/main" id="{388CF590-A7AC-47AA-9D77-5FF843A9CEE8}"/>
               </a:ext>
             </a:extLst>
           </p:cNvPr>
@@ -2661,7 +2661,7 @@
           <p:cNvPr id="14" name="TextBox 13">
             <a:extLst>
               <a:ext uri="{FF2B5EF4-FFF2-40B4-BE49-F238E27FC236}">
-                <a16:creationId xmlns:a16="http://schemas.microsoft.com/office/drawing/2014/main" xmlns="" id="{7F82C53E-6891-4695-A1B4-3BB471D7FA35}"/>
+                <a16:creationId xmlns="" xmlns:a16="http://schemas.microsoft.com/office/drawing/2014/main" id="{7F82C53E-6891-4695-A1B4-3BB471D7FA35}"/>
               </a:ext>
             </a:extLst>
           </p:cNvPr>
@@ -2708,7 +2708,7 @@
           <p:cNvPr id="15" name="TextBox 14">
             <a:extLst>
               <a:ext uri="{FF2B5EF4-FFF2-40B4-BE49-F238E27FC236}">
-                <a16:creationId xmlns:a16="http://schemas.microsoft.com/office/drawing/2014/main" xmlns="" id="{E1D76FB9-48AC-45CA-8F0D-FD198B4F22AE}"/>
+                <a16:creationId xmlns="" xmlns:a16="http://schemas.microsoft.com/office/drawing/2014/main" id="{E1D76FB9-48AC-45CA-8F0D-FD198B4F22AE}"/>
               </a:ext>
             </a:extLst>
           </p:cNvPr>
@@ -3133,7 +3133,7 @@
           <p:cNvPr id="18" name="Group 17">
             <a:extLst>
               <a:ext uri="{FF2B5EF4-FFF2-40B4-BE49-F238E27FC236}">
-                <a16:creationId xmlns:a16="http://schemas.microsoft.com/office/drawing/2014/main" xmlns="" id="{F6915FD2-D0E6-4DEB-B1C9-9340552A3344}"/>
+                <a16:creationId xmlns="" xmlns:a16="http://schemas.microsoft.com/office/drawing/2014/main" id="{F6915FD2-D0E6-4DEB-B1C9-9340552A3344}"/>
               </a:ext>
             </a:extLst>
           </p:cNvPr>
@@ -3153,7 +3153,7 @@
             <p:cNvPr id="19" name="Freeform: Shape 3">
               <a:extLst>
                 <a:ext uri="{FF2B5EF4-FFF2-40B4-BE49-F238E27FC236}">
-                  <a16:creationId xmlns:a16="http://schemas.microsoft.com/office/drawing/2014/main" xmlns="" id="{D1D8A4D9-073F-4BB6-A662-1EFDCB85E80C}"/>
+                  <a16:creationId xmlns="" xmlns:a16="http://schemas.microsoft.com/office/drawing/2014/main" id="{D1D8A4D9-073F-4BB6-A662-1EFDCB85E80C}"/>
                 </a:ext>
               </a:extLst>
             </p:cNvPr>
@@ -3361,7 +3361,7 @@
             <p:cNvPr id="20" name="Freeform: Shape 4">
               <a:extLst>
                 <a:ext uri="{FF2B5EF4-FFF2-40B4-BE49-F238E27FC236}">
-                  <a16:creationId xmlns:a16="http://schemas.microsoft.com/office/drawing/2014/main" xmlns="" id="{07DF9A70-42B4-4956-A6DE-65EC83042B41}"/>
+                  <a16:creationId xmlns="" xmlns:a16="http://schemas.microsoft.com/office/drawing/2014/main" id="{07DF9A70-42B4-4956-A6DE-65EC83042B41}"/>
                 </a:ext>
               </a:extLst>
             </p:cNvPr>
@@ -3509,7 +3509,7 @@
             <p:cNvPr id="21" name="Freeform: Shape 5">
               <a:extLst>
                 <a:ext uri="{FF2B5EF4-FFF2-40B4-BE49-F238E27FC236}">
-                  <a16:creationId xmlns:a16="http://schemas.microsoft.com/office/drawing/2014/main" xmlns="" id="{A1EA2B28-8846-4C7F-88A9-8ADBC0501178}"/>
+                  <a16:creationId xmlns="" xmlns:a16="http://schemas.microsoft.com/office/drawing/2014/main" id="{A1EA2B28-8846-4C7F-88A9-8ADBC0501178}"/>
                 </a:ext>
               </a:extLst>
             </p:cNvPr>
@@ -4144,7 +4144,7 @@
             <p:cNvPr id="22" name="Freeform: Shape 6">
               <a:extLst>
                 <a:ext uri="{FF2B5EF4-FFF2-40B4-BE49-F238E27FC236}">
-                  <a16:creationId xmlns:a16="http://schemas.microsoft.com/office/drawing/2014/main" xmlns="" id="{BF3EF62E-06EA-4D0D-A441-B65B6FB961EF}"/>
+                  <a16:creationId xmlns="" xmlns:a16="http://schemas.microsoft.com/office/drawing/2014/main" id="{BF3EF62E-06EA-4D0D-A441-B65B6FB961EF}"/>
                 </a:ext>
               </a:extLst>
             </p:cNvPr>
@@ -5023,7 +5023,7 @@
             <p:cNvPr id="23" name="Freeform: Shape 7">
               <a:extLst>
                 <a:ext uri="{FF2B5EF4-FFF2-40B4-BE49-F238E27FC236}">
-                  <a16:creationId xmlns:a16="http://schemas.microsoft.com/office/drawing/2014/main" xmlns="" id="{2E20A684-E434-40C4-84DE-66387E9E9CDA}"/>
+                  <a16:creationId xmlns="" xmlns:a16="http://schemas.microsoft.com/office/drawing/2014/main" id="{2E20A684-E434-40C4-84DE-66387E9E9CDA}"/>
                 </a:ext>
               </a:extLst>
             </p:cNvPr>
@@ -5359,7 +5359,7 @@
             <p:cNvPr id="24" name="Freeform: Shape 8">
               <a:extLst>
                 <a:ext uri="{FF2B5EF4-FFF2-40B4-BE49-F238E27FC236}">
-                  <a16:creationId xmlns:a16="http://schemas.microsoft.com/office/drawing/2014/main" xmlns="" id="{32723C70-5094-47B0-BC93-ED8A527333DB}"/>
+                  <a16:creationId xmlns="" xmlns:a16="http://schemas.microsoft.com/office/drawing/2014/main" id="{32723C70-5094-47B0-BC93-ED8A527333DB}"/>
                 </a:ext>
               </a:extLst>
             </p:cNvPr>
@@ -5585,7 +5585,7 @@
             <p:cNvPr id="25" name="Freeform: Shape 9">
               <a:extLst>
                 <a:ext uri="{FF2B5EF4-FFF2-40B4-BE49-F238E27FC236}">
-                  <a16:creationId xmlns:a16="http://schemas.microsoft.com/office/drawing/2014/main" xmlns="" id="{B1EF34FD-D5C4-4393-B6D7-67E4DFF7534A}"/>
+                  <a16:creationId xmlns="" xmlns:a16="http://schemas.microsoft.com/office/drawing/2014/main" id="{B1EF34FD-D5C4-4393-B6D7-67E4DFF7534A}"/>
                 </a:ext>
               </a:extLst>
             </p:cNvPr>
@@ -5867,7 +5867,7 @@
             <p:cNvPr id="26" name="Freeform: Shape 10">
               <a:extLst>
                 <a:ext uri="{FF2B5EF4-FFF2-40B4-BE49-F238E27FC236}">
-                  <a16:creationId xmlns:a16="http://schemas.microsoft.com/office/drawing/2014/main" xmlns="" id="{FF4A134F-9F05-4D10-8F90-D5BBBDC78A1A}"/>
+                  <a16:creationId xmlns="" xmlns:a16="http://schemas.microsoft.com/office/drawing/2014/main" id="{FF4A134F-9F05-4D10-8F90-D5BBBDC78A1A}"/>
                 </a:ext>
               </a:extLst>
             </p:cNvPr>
@@ -7901,7 +7901,7 @@
             <p:cNvPr id="41" name="Group 40">
               <a:extLst>
                 <a:ext uri="{FF2B5EF4-FFF2-40B4-BE49-F238E27FC236}">
-                  <a16:creationId xmlns:a16="http://schemas.microsoft.com/office/drawing/2014/main" xmlns="" id="{E5F9C0EC-A17E-433A-8DA0-F9E36EE2B618}"/>
+                  <a16:creationId xmlns="" xmlns:a16="http://schemas.microsoft.com/office/drawing/2014/main" id="{E5F9C0EC-A17E-433A-8DA0-F9E36EE2B618}"/>
                 </a:ext>
               </a:extLst>
             </p:cNvPr>
@@ -7921,7 +7921,7 @@
               <p:cNvPr id="45" name="Freeform: Shape 15">
                 <a:extLst>
                   <a:ext uri="{FF2B5EF4-FFF2-40B4-BE49-F238E27FC236}">
-                    <a16:creationId xmlns:a16="http://schemas.microsoft.com/office/drawing/2014/main" xmlns="" id="{C2A4C65E-0C75-4DB0-82EF-744D0558FF37}"/>
+                    <a16:creationId xmlns="" xmlns:a16="http://schemas.microsoft.com/office/drawing/2014/main" id="{C2A4C65E-0C75-4DB0-82EF-744D0558FF37}"/>
                   </a:ext>
                 </a:extLst>
               </p:cNvPr>
@@ -8017,7 +8017,7 @@
               <p:cNvPr id="46" name="Freeform: Shape 16">
                 <a:extLst>
                   <a:ext uri="{FF2B5EF4-FFF2-40B4-BE49-F238E27FC236}">
-                    <a16:creationId xmlns:a16="http://schemas.microsoft.com/office/drawing/2014/main" xmlns="" id="{8AB7B3CA-67A1-4869-BE7B-1BEA69037B5E}"/>
+                    <a16:creationId xmlns="" xmlns:a16="http://schemas.microsoft.com/office/drawing/2014/main" id="{8AB7B3CA-67A1-4869-BE7B-1BEA69037B5E}"/>
                   </a:ext>
                 </a:extLst>
               </p:cNvPr>
@@ -8133,7 +8133,7 @@
               <p:cNvPr id="47" name="Freeform: Shape 17">
                 <a:extLst>
                   <a:ext uri="{FF2B5EF4-FFF2-40B4-BE49-F238E27FC236}">
-                    <a16:creationId xmlns:a16="http://schemas.microsoft.com/office/drawing/2014/main" xmlns="" id="{4D98CE6B-6D12-45B9-A830-4F286947E6BE}"/>
+                    <a16:creationId xmlns="" xmlns:a16="http://schemas.microsoft.com/office/drawing/2014/main" id="{4D98CE6B-6D12-45B9-A830-4F286947E6BE}"/>
                   </a:ext>
                 </a:extLst>
               </p:cNvPr>
@@ -8259,7 +8259,7 @@
               <p:cNvPr id="48" name="Freeform: Shape 18">
                 <a:extLst>
                   <a:ext uri="{FF2B5EF4-FFF2-40B4-BE49-F238E27FC236}">
-                    <a16:creationId xmlns:a16="http://schemas.microsoft.com/office/drawing/2014/main" xmlns="" id="{A65AE8CE-85F5-4CEF-80A8-3599D73F25D1}"/>
+                    <a16:creationId xmlns="" xmlns:a16="http://schemas.microsoft.com/office/drawing/2014/main" id="{A65AE8CE-85F5-4CEF-80A8-3599D73F25D1}"/>
                   </a:ext>
                 </a:extLst>
               </p:cNvPr>
@@ -8385,7 +8385,7 @@
               <p:cNvPr id="49" name="Freeform: Shape 19">
                 <a:extLst>
                   <a:ext uri="{FF2B5EF4-FFF2-40B4-BE49-F238E27FC236}">
-                    <a16:creationId xmlns:a16="http://schemas.microsoft.com/office/drawing/2014/main" xmlns="" id="{4FC040DF-8608-444D-92AC-39F0AE68CB07}"/>
+                    <a16:creationId xmlns="" xmlns:a16="http://schemas.microsoft.com/office/drawing/2014/main" id="{4FC040DF-8608-444D-92AC-39F0AE68CB07}"/>
                   </a:ext>
                 </a:extLst>
               </p:cNvPr>
@@ -8481,7 +8481,7 @@
               <p:cNvPr id="50" name="Freeform: Shape 20">
                 <a:extLst>
                   <a:ext uri="{FF2B5EF4-FFF2-40B4-BE49-F238E27FC236}">
-                    <a16:creationId xmlns:a16="http://schemas.microsoft.com/office/drawing/2014/main" xmlns="" id="{1389FFD7-DE4F-47D1-9314-82320CDDE13E}"/>
+                    <a16:creationId xmlns="" xmlns:a16="http://schemas.microsoft.com/office/drawing/2014/main" id="{1389FFD7-DE4F-47D1-9314-82320CDDE13E}"/>
                   </a:ext>
                 </a:extLst>
               </p:cNvPr>
@@ -8578,7 +8578,7 @@
             <p:cNvPr id="42" name="Freeform: Shape 12">
               <a:extLst>
                 <a:ext uri="{FF2B5EF4-FFF2-40B4-BE49-F238E27FC236}">
-                  <a16:creationId xmlns:a16="http://schemas.microsoft.com/office/drawing/2014/main" xmlns="" id="{E972D6D6-3A17-4A2E-AAB1-897CF6022D4F}"/>
+                  <a16:creationId xmlns="" xmlns:a16="http://schemas.microsoft.com/office/drawing/2014/main" id="{E972D6D6-3A17-4A2E-AAB1-897CF6022D4F}"/>
                 </a:ext>
               </a:extLst>
             </p:cNvPr>
@@ -9011,7 +9011,7 @@
             <p:cNvPr id="43" name="Freeform: Shape 13">
               <a:extLst>
                 <a:ext uri="{FF2B5EF4-FFF2-40B4-BE49-F238E27FC236}">
-                  <a16:creationId xmlns:a16="http://schemas.microsoft.com/office/drawing/2014/main" xmlns="" id="{C3898C49-F9BC-4092-B007-970A80368E3F}"/>
+                  <a16:creationId xmlns="" xmlns:a16="http://schemas.microsoft.com/office/drawing/2014/main" id="{C3898C49-F9BC-4092-B007-970A80368E3F}"/>
                 </a:ext>
               </a:extLst>
             </p:cNvPr>
@@ -11092,7 +11092,7 @@
             <p:cNvPr id="44" name="Freeform: Shape 14">
               <a:extLst>
                 <a:ext uri="{FF2B5EF4-FFF2-40B4-BE49-F238E27FC236}">
-                  <a16:creationId xmlns:a16="http://schemas.microsoft.com/office/drawing/2014/main" xmlns="" id="{4BECFD8E-5027-4C50-A0BB-AC8B7749E800}"/>
+                  <a16:creationId xmlns="" xmlns:a16="http://schemas.microsoft.com/office/drawing/2014/main" id="{4BECFD8E-5027-4C50-A0BB-AC8B7749E800}"/>
                 </a:ext>
               </a:extLst>
             </p:cNvPr>
@@ -11409,7 +11409,7 @@
           <p:cNvPr id="51" name="Text Placeholder 1">
             <a:extLst>
               <a:ext uri="{FF2B5EF4-FFF2-40B4-BE49-F238E27FC236}">
-                <a16:creationId xmlns:a16="http://schemas.microsoft.com/office/drawing/2014/main" xmlns="" id="{D735F7F3-C1B5-4B60-A00A-4EB618DDFB5A}"/>
+                <a16:creationId xmlns="" xmlns:a16="http://schemas.microsoft.com/office/drawing/2014/main" id="{D735F7F3-C1B5-4B60-A00A-4EB618DDFB5A}"/>
               </a:ext>
             </a:extLst>
           </p:cNvPr>
@@ -11622,7 +11622,7 @@
           <p:cNvPr id="2" name="Text Placeholder 1">
             <a:extLst>
               <a:ext uri="{FF2B5EF4-FFF2-40B4-BE49-F238E27FC236}">
-                <a16:creationId xmlns:a16="http://schemas.microsoft.com/office/drawing/2014/main" xmlns="" id="{D735F7F3-C1B5-4B60-A00A-4EB618DDFB5A}"/>
+                <a16:creationId xmlns="" xmlns:a16="http://schemas.microsoft.com/office/drawing/2014/main" id="{D735F7F3-C1B5-4B60-A00A-4EB618DDFB5A}"/>
               </a:ext>
             </a:extLst>
           </p:cNvPr>
@@ -11690,7 +11690,7 @@
           <p:cNvPr id="27" name="Group 26">
             <a:extLst>
               <a:ext uri="{FF2B5EF4-FFF2-40B4-BE49-F238E27FC236}">
-                <a16:creationId xmlns:a16="http://schemas.microsoft.com/office/drawing/2014/main" xmlns="" id="{74019515-C708-4224-96AF-FB25D0CFC55C}"/>
+                <a16:creationId xmlns="" xmlns:a16="http://schemas.microsoft.com/office/drawing/2014/main" id="{74019515-C708-4224-96AF-FB25D0CFC55C}"/>
               </a:ext>
             </a:extLst>
           </p:cNvPr>
@@ -11710,7 +11710,7 @@
             <p:cNvPr id="28" name="Freeform: Shape 7">
               <a:extLst>
                 <a:ext uri="{FF2B5EF4-FFF2-40B4-BE49-F238E27FC236}">
-                  <a16:creationId xmlns:a16="http://schemas.microsoft.com/office/drawing/2014/main" xmlns="" id="{8CD1BDD2-61A7-4865-9C24-3E76CCF075B1}"/>
+                  <a16:creationId xmlns="" xmlns:a16="http://schemas.microsoft.com/office/drawing/2014/main" id="{8CD1BDD2-61A7-4865-9C24-3E76CCF075B1}"/>
                 </a:ext>
               </a:extLst>
             </p:cNvPr>
@@ -12446,7 +12446,7 @@
             <p:cNvPr id="29" name="Freeform: Shape 8">
               <a:extLst>
                 <a:ext uri="{FF2B5EF4-FFF2-40B4-BE49-F238E27FC236}">
-                  <a16:creationId xmlns:a16="http://schemas.microsoft.com/office/drawing/2014/main" xmlns="" id="{DE93E90B-9B02-4EA8-A7D7-A7233A0293E2}"/>
+                  <a16:creationId xmlns="" xmlns:a16="http://schemas.microsoft.com/office/drawing/2014/main" id="{DE93E90B-9B02-4EA8-A7D7-A7233A0293E2}"/>
                 </a:ext>
               </a:extLst>
             </p:cNvPr>
@@ -13002,7 +13002,7 @@
             <p:cNvPr id="30" name="Freeform: Shape 15">
               <a:extLst>
                 <a:ext uri="{FF2B5EF4-FFF2-40B4-BE49-F238E27FC236}">
-                  <a16:creationId xmlns:a16="http://schemas.microsoft.com/office/drawing/2014/main" xmlns="" id="{04BD0F51-FF96-45DB-95C8-B2C369E98F71}"/>
+                  <a16:creationId xmlns="" xmlns:a16="http://schemas.microsoft.com/office/drawing/2014/main" id="{04BD0F51-FF96-45DB-95C8-B2C369E98F71}"/>
                 </a:ext>
               </a:extLst>
             </p:cNvPr>
@@ -13190,7 +13190,7 @@
             <p:cNvPr id="31" name="Freeform: Shape 25">
               <a:extLst>
                 <a:ext uri="{FF2B5EF4-FFF2-40B4-BE49-F238E27FC236}">
-                  <a16:creationId xmlns:a16="http://schemas.microsoft.com/office/drawing/2014/main" xmlns="" id="{C457CD20-7CF9-4D8A-BAC3-C6F8ECA96ADD}"/>
+                  <a16:creationId xmlns="" xmlns:a16="http://schemas.microsoft.com/office/drawing/2014/main" id="{C457CD20-7CF9-4D8A-BAC3-C6F8ECA96ADD}"/>
                 </a:ext>
               </a:extLst>
             </p:cNvPr>
@@ -13319,7 +13319,7 @@
           <p:cNvPr id="32" name="Group 31">
             <a:extLst>
               <a:ext uri="{FF2B5EF4-FFF2-40B4-BE49-F238E27FC236}">
-                <a16:creationId xmlns:a16="http://schemas.microsoft.com/office/drawing/2014/main" xmlns="" id="{1CD48630-98A5-49A8-8875-F76A88E89403}"/>
+                <a16:creationId xmlns="" xmlns:a16="http://schemas.microsoft.com/office/drawing/2014/main" id="{1CD48630-98A5-49A8-8875-F76A88E89403}"/>
               </a:ext>
             </a:extLst>
           </p:cNvPr>
@@ -13339,7 +13339,7 @@
             <p:cNvPr id="33" name="Freeform: Shape 258">
               <a:extLst>
                 <a:ext uri="{FF2B5EF4-FFF2-40B4-BE49-F238E27FC236}">
-                  <a16:creationId xmlns:a16="http://schemas.microsoft.com/office/drawing/2014/main" xmlns="" id="{DA05075D-B224-423E-999D-E971743A190F}"/>
+                  <a16:creationId xmlns="" xmlns:a16="http://schemas.microsoft.com/office/drawing/2014/main" id="{DA05075D-B224-423E-999D-E971743A190F}"/>
                 </a:ext>
               </a:extLst>
             </p:cNvPr>
@@ -13755,7 +13755,7 @@
             <p:cNvPr id="34" name="Freeform: Shape 259">
               <a:extLst>
                 <a:ext uri="{FF2B5EF4-FFF2-40B4-BE49-F238E27FC236}">
-                  <a16:creationId xmlns:a16="http://schemas.microsoft.com/office/drawing/2014/main" xmlns="" id="{AAA1B918-197D-4EB1-BB80-41C0ABD6C895}"/>
+                  <a16:creationId xmlns="" xmlns:a16="http://schemas.microsoft.com/office/drawing/2014/main" id="{AAA1B918-197D-4EB1-BB80-41C0ABD6C895}"/>
                 </a:ext>
               </a:extLst>
             </p:cNvPr>
@@ -14011,7 +14011,7 @@
             <p:cNvPr id="35" name="Freeform: Shape 260">
               <a:extLst>
                 <a:ext uri="{FF2B5EF4-FFF2-40B4-BE49-F238E27FC236}">
-                  <a16:creationId xmlns:a16="http://schemas.microsoft.com/office/drawing/2014/main" xmlns="" id="{D7C8822F-F1CD-4A63-8EE6-7C0DEE6CEEB1}"/>
+                  <a16:creationId xmlns="" xmlns:a16="http://schemas.microsoft.com/office/drawing/2014/main" id="{D7C8822F-F1CD-4A63-8EE6-7C0DEE6CEEB1}"/>
                 </a:ext>
               </a:extLst>
             </p:cNvPr>
@@ -14169,7 +14169,7 @@
             <p:cNvPr id="36" name="Freeform: Shape 261">
               <a:extLst>
                 <a:ext uri="{FF2B5EF4-FFF2-40B4-BE49-F238E27FC236}">
-                  <a16:creationId xmlns:a16="http://schemas.microsoft.com/office/drawing/2014/main" xmlns="" id="{95D94FDD-821A-4843-8F55-B3BB99795A6D}"/>
+                  <a16:creationId xmlns="" xmlns:a16="http://schemas.microsoft.com/office/drawing/2014/main" id="{95D94FDD-821A-4843-8F55-B3BB99795A6D}"/>
                 </a:ext>
               </a:extLst>
             </p:cNvPr>
@@ -14347,7 +14347,7 @@
             <p:cNvPr id="37" name="Freeform: Shape 262">
               <a:extLst>
                 <a:ext uri="{FF2B5EF4-FFF2-40B4-BE49-F238E27FC236}">
-                  <a16:creationId xmlns:a16="http://schemas.microsoft.com/office/drawing/2014/main" xmlns="" id="{01BC69FB-3C0B-4747-9DA2-5D2BE13E52DF}"/>
+                  <a16:creationId xmlns="" xmlns:a16="http://schemas.microsoft.com/office/drawing/2014/main" id="{01BC69FB-3C0B-4747-9DA2-5D2BE13E52DF}"/>
                 </a:ext>
               </a:extLst>
             </p:cNvPr>
@@ -14525,7 +14525,7 @@
             <p:cNvPr id="38" name="Graphic 81">
               <a:extLst>
                 <a:ext uri="{FF2B5EF4-FFF2-40B4-BE49-F238E27FC236}">
-                  <a16:creationId xmlns:a16="http://schemas.microsoft.com/office/drawing/2014/main" xmlns="" id="{5D098C22-BD9C-41DE-AC34-3E00A692D954}"/>
+                  <a16:creationId xmlns="" xmlns:a16="http://schemas.microsoft.com/office/drawing/2014/main" id="{5D098C22-BD9C-41DE-AC34-3E00A692D954}"/>
                 </a:ext>
               </a:extLst>
             </p:cNvPr>
@@ -14548,7 +14548,7 @@
               <p:cNvPr id="39" name="Freeform: Shape 264">
                 <a:extLst>
                   <a:ext uri="{FF2B5EF4-FFF2-40B4-BE49-F238E27FC236}">
-                    <a16:creationId xmlns:a16="http://schemas.microsoft.com/office/drawing/2014/main" xmlns="" id="{1BEED036-AD1F-49F6-8F64-1E686860ADC9}"/>
+                    <a16:creationId xmlns="" xmlns:a16="http://schemas.microsoft.com/office/drawing/2014/main" id="{1BEED036-AD1F-49F6-8F64-1E686860ADC9}"/>
                   </a:ext>
                 </a:extLst>
               </p:cNvPr>
@@ -14716,7 +14716,7 @@
               <p:cNvPr id="40" name="Freeform: Shape 265">
                 <a:extLst>
                   <a:ext uri="{FF2B5EF4-FFF2-40B4-BE49-F238E27FC236}">
-                    <a16:creationId xmlns:a16="http://schemas.microsoft.com/office/drawing/2014/main" xmlns="" id="{7AF1BE1C-E9B0-4782-BB31-A33ACDF0EC6C}"/>
+                    <a16:creationId xmlns="" xmlns:a16="http://schemas.microsoft.com/office/drawing/2014/main" id="{7AF1BE1C-E9B0-4782-BB31-A33ACDF0EC6C}"/>
                   </a:ext>
                 </a:extLst>
               </p:cNvPr>
@@ -14941,7 +14941,7 @@
           <p:cNvPr id="2" name="Text Placeholder 1">
             <a:extLst>
               <a:ext uri="{FF2B5EF4-FFF2-40B4-BE49-F238E27FC236}">
-                <a16:creationId xmlns:a16="http://schemas.microsoft.com/office/drawing/2014/main" xmlns="" id="{D735F7F3-C1B5-4B60-A00A-4EB618DDFB5A}"/>
+                <a16:creationId xmlns="" xmlns:a16="http://schemas.microsoft.com/office/drawing/2014/main" id="{D735F7F3-C1B5-4B60-A00A-4EB618DDFB5A}"/>
               </a:ext>
             </a:extLst>
           </p:cNvPr>
@@ -14970,7 +14970,7 @@
           <p:cNvPr id="3" name="Group 2">
             <a:extLst>
               <a:ext uri="{FF2B5EF4-FFF2-40B4-BE49-F238E27FC236}">
-                <a16:creationId xmlns:a16="http://schemas.microsoft.com/office/drawing/2014/main" xmlns="" id="{55D59553-A039-471C-AE26-F96ADECAB6CF}"/>
+                <a16:creationId xmlns="" xmlns:a16="http://schemas.microsoft.com/office/drawing/2014/main" id="{55D59553-A039-471C-AE26-F96ADECAB6CF}"/>
               </a:ext>
             </a:extLst>
           </p:cNvPr>
@@ -14998,7 +14998,7 @@
             <p:cNvPr id="94" name="Freeform: Shape 93">
               <a:extLst>
                 <a:ext uri="{FF2B5EF4-FFF2-40B4-BE49-F238E27FC236}">
-                  <a16:creationId xmlns:a16="http://schemas.microsoft.com/office/drawing/2014/main" xmlns="" id="{751AE6B3-E184-44A5-BDD7-FD4611BA780A}"/>
+                  <a16:creationId xmlns="" xmlns:a16="http://schemas.microsoft.com/office/drawing/2014/main" id="{751AE6B3-E184-44A5-BDD7-FD4611BA780A}"/>
                 </a:ext>
               </a:extLst>
             </p:cNvPr>
@@ -15291,7 +15291,7 @@
             <p:cNvPr id="52" name="Group 51">
               <a:extLst>
                 <a:ext uri="{FF2B5EF4-FFF2-40B4-BE49-F238E27FC236}">
-                  <a16:creationId xmlns:a16="http://schemas.microsoft.com/office/drawing/2014/main" xmlns="" id="{3480DBFD-B6D4-420D-95A4-9DD9E200101D}"/>
+                  <a16:creationId xmlns="" xmlns:a16="http://schemas.microsoft.com/office/drawing/2014/main" id="{3480DBFD-B6D4-420D-95A4-9DD9E200101D}"/>
                 </a:ext>
               </a:extLst>
             </p:cNvPr>
@@ -15311,7 +15311,7 @@
               <p:cNvPr id="53" name="Group 52">
                 <a:extLst>
                   <a:ext uri="{FF2B5EF4-FFF2-40B4-BE49-F238E27FC236}">
-                    <a16:creationId xmlns:a16="http://schemas.microsoft.com/office/drawing/2014/main" xmlns="" id="{694CA47E-15C9-45B7-9685-1DD17B02D1DB}"/>
+                    <a16:creationId xmlns="" xmlns:a16="http://schemas.microsoft.com/office/drawing/2014/main" id="{694CA47E-15C9-45B7-9685-1DD17B02D1DB}"/>
                   </a:ext>
                 </a:extLst>
               </p:cNvPr>
@@ -15338,7 +15338,7 @@
                 <p:cNvPr id="66" name="Freeform 15">
                   <a:extLst>
                     <a:ext uri="{FF2B5EF4-FFF2-40B4-BE49-F238E27FC236}">
-                      <a16:creationId xmlns:a16="http://schemas.microsoft.com/office/drawing/2014/main" xmlns="" id="{8CFA59E0-877E-4828-8E8F-D9749F56B681}"/>
+                      <a16:creationId xmlns="" xmlns:a16="http://schemas.microsoft.com/office/drawing/2014/main" id="{8CFA59E0-877E-4828-8E8F-D9749F56B681}"/>
                     </a:ext>
                   </a:extLst>
                 </p:cNvPr>
@@ -16632,7 +16632,7 @@
                 <p:cNvPr id="67" name="Rectangle 22">
                   <a:extLst>
                     <a:ext uri="{FF2B5EF4-FFF2-40B4-BE49-F238E27FC236}">
-                      <a16:creationId xmlns:a16="http://schemas.microsoft.com/office/drawing/2014/main" xmlns="" id="{C067EB7C-7925-4A0A-8C7D-4F28711D249F}"/>
+                      <a16:creationId xmlns="" xmlns:a16="http://schemas.microsoft.com/office/drawing/2014/main" id="{C067EB7C-7925-4A0A-8C7D-4F28711D249F}"/>
                     </a:ext>
                   </a:extLst>
                 </p:cNvPr>
@@ -16768,7 +16768,7 @@
               <p:cNvPr id="54" name="Group 53">
                 <a:extLst>
                   <a:ext uri="{FF2B5EF4-FFF2-40B4-BE49-F238E27FC236}">
-                    <a16:creationId xmlns:a16="http://schemas.microsoft.com/office/drawing/2014/main" xmlns="" id="{679EE6A1-8171-4DFB-AABD-9E9CA0B26E0D}"/>
+                    <a16:creationId xmlns="" xmlns:a16="http://schemas.microsoft.com/office/drawing/2014/main" id="{679EE6A1-8171-4DFB-AABD-9E9CA0B26E0D}"/>
                   </a:ext>
                 </a:extLst>
               </p:cNvPr>
@@ -16795,7 +16795,7 @@
                 <p:cNvPr id="64" name="Freeform 18">
                   <a:extLst>
                     <a:ext uri="{FF2B5EF4-FFF2-40B4-BE49-F238E27FC236}">
-                      <a16:creationId xmlns:a16="http://schemas.microsoft.com/office/drawing/2014/main" xmlns="" id="{EDBF89F9-BAE3-4F56-AD8E-8228F08B05E8}"/>
+                      <a16:creationId xmlns="" xmlns:a16="http://schemas.microsoft.com/office/drawing/2014/main" id="{EDBF89F9-BAE3-4F56-AD8E-8228F08B05E8}"/>
                     </a:ext>
                   </a:extLst>
                 </p:cNvPr>
@@ -17765,7 +17765,7 @@
                 <p:cNvPr id="65" name="Freeform 19">
                   <a:extLst>
                     <a:ext uri="{FF2B5EF4-FFF2-40B4-BE49-F238E27FC236}">
-                      <a16:creationId xmlns:a16="http://schemas.microsoft.com/office/drawing/2014/main" xmlns="" id="{52AC83ED-6081-44AB-AE10-D94D76014E84}"/>
+                      <a16:creationId xmlns="" xmlns:a16="http://schemas.microsoft.com/office/drawing/2014/main" id="{52AC83ED-6081-44AB-AE10-D94D76014E84}"/>
                     </a:ext>
                   </a:extLst>
                 </p:cNvPr>
@@ -18104,7 +18104,7 @@
               <p:cNvPr id="55" name="Group 54">
                 <a:extLst>
                   <a:ext uri="{FF2B5EF4-FFF2-40B4-BE49-F238E27FC236}">
-                    <a16:creationId xmlns:a16="http://schemas.microsoft.com/office/drawing/2014/main" xmlns="" id="{C672A13F-8FB6-452C-90A9-9E1404B1DB7F}"/>
+                    <a16:creationId xmlns="" xmlns:a16="http://schemas.microsoft.com/office/drawing/2014/main" id="{C672A13F-8FB6-452C-90A9-9E1404B1DB7F}"/>
                   </a:ext>
                 </a:extLst>
               </p:cNvPr>
@@ -18131,7 +18131,7 @@
                 <p:cNvPr id="62" name="Freeform 21">
                   <a:extLst>
                     <a:ext uri="{FF2B5EF4-FFF2-40B4-BE49-F238E27FC236}">
-                      <a16:creationId xmlns:a16="http://schemas.microsoft.com/office/drawing/2014/main" xmlns="" id="{EA8532AC-8DFF-4DE3-A652-7810AC0B6027}"/>
+                      <a16:creationId xmlns="" xmlns:a16="http://schemas.microsoft.com/office/drawing/2014/main" id="{EA8532AC-8DFF-4DE3-A652-7810AC0B6027}"/>
                     </a:ext>
                   </a:extLst>
                 </p:cNvPr>
@@ -19425,7 +19425,7 @@
                 <p:cNvPr id="63" name="Rectangle 22">
                   <a:extLst>
                     <a:ext uri="{FF2B5EF4-FFF2-40B4-BE49-F238E27FC236}">
-                      <a16:creationId xmlns:a16="http://schemas.microsoft.com/office/drawing/2014/main" xmlns="" id="{BF033FB8-301F-4737-A1A1-F8EEAB2A337F}"/>
+                      <a16:creationId xmlns="" xmlns:a16="http://schemas.microsoft.com/office/drawing/2014/main" id="{BF033FB8-301F-4737-A1A1-F8EEAB2A337F}"/>
                     </a:ext>
                   </a:extLst>
                 </p:cNvPr>
@@ -19561,7 +19561,7 @@
               <p:cNvPr id="56" name="Group 55">
                 <a:extLst>
                   <a:ext uri="{FF2B5EF4-FFF2-40B4-BE49-F238E27FC236}">
-                    <a16:creationId xmlns:a16="http://schemas.microsoft.com/office/drawing/2014/main" xmlns="" id="{BD6F8D50-52F5-4102-B5DD-5834564E86EA}"/>
+                    <a16:creationId xmlns="" xmlns:a16="http://schemas.microsoft.com/office/drawing/2014/main" id="{BD6F8D50-52F5-4102-B5DD-5834564E86EA}"/>
                   </a:ext>
                 </a:extLst>
               </p:cNvPr>
@@ -19588,7 +19588,7 @@
                 <p:cNvPr id="60" name="Freeform 24">
                   <a:extLst>
                     <a:ext uri="{FF2B5EF4-FFF2-40B4-BE49-F238E27FC236}">
-                      <a16:creationId xmlns:a16="http://schemas.microsoft.com/office/drawing/2014/main" xmlns="" id="{5F3DC716-76B9-455D-BE45-C99D9E48B53F}"/>
+                      <a16:creationId xmlns="" xmlns:a16="http://schemas.microsoft.com/office/drawing/2014/main" id="{5F3DC716-76B9-455D-BE45-C99D9E48B53F}"/>
                     </a:ext>
                   </a:extLst>
                 </p:cNvPr>
@@ -20854,7 +20854,7 @@
                 <p:cNvPr id="61" name="Rectangle 22">
                   <a:extLst>
                     <a:ext uri="{FF2B5EF4-FFF2-40B4-BE49-F238E27FC236}">
-                      <a16:creationId xmlns:a16="http://schemas.microsoft.com/office/drawing/2014/main" xmlns="" id="{38EF642D-56BE-4E6D-A977-BBCCF9C73E4B}"/>
+                      <a16:creationId xmlns="" xmlns:a16="http://schemas.microsoft.com/office/drawing/2014/main" id="{38EF642D-56BE-4E6D-A977-BBCCF9C73E4B}"/>
                     </a:ext>
                   </a:extLst>
                 </p:cNvPr>
@@ -20990,7 +20990,7 @@
               <p:cNvPr id="57" name="Group 56">
                 <a:extLst>
                   <a:ext uri="{FF2B5EF4-FFF2-40B4-BE49-F238E27FC236}">
-                    <a16:creationId xmlns:a16="http://schemas.microsoft.com/office/drawing/2014/main" xmlns="" id="{B0757341-3EF7-412E-A2DC-1324573192D9}"/>
+                    <a16:creationId xmlns="" xmlns:a16="http://schemas.microsoft.com/office/drawing/2014/main" id="{B0757341-3EF7-412E-A2DC-1324573192D9}"/>
                   </a:ext>
                 </a:extLst>
               </p:cNvPr>
@@ -21017,7 +21017,7 @@
                 <p:cNvPr id="58" name="Freeform 27">
                   <a:extLst>
                     <a:ext uri="{FF2B5EF4-FFF2-40B4-BE49-F238E27FC236}">
-                      <a16:creationId xmlns:a16="http://schemas.microsoft.com/office/drawing/2014/main" xmlns="" id="{DF03E9CA-4223-4A49-B27F-8970C5CA10F4}"/>
+                      <a16:creationId xmlns="" xmlns:a16="http://schemas.microsoft.com/office/drawing/2014/main" id="{DF03E9CA-4223-4A49-B27F-8970C5CA10F4}"/>
                     </a:ext>
                   </a:extLst>
                 </p:cNvPr>
@@ -21980,7 +21980,7 @@
                 <p:cNvPr id="59" name="Freeform 28">
                   <a:extLst>
                     <a:ext uri="{FF2B5EF4-FFF2-40B4-BE49-F238E27FC236}">
-                      <a16:creationId xmlns:a16="http://schemas.microsoft.com/office/drawing/2014/main" xmlns="" id="{FA682260-64ED-4EBF-BB39-C2BC429B7ABB}"/>
+                      <a16:creationId xmlns="" xmlns:a16="http://schemas.microsoft.com/office/drawing/2014/main" id="{FA682260-64ED-4EBF-BB39-C2BC429B7ABB}"/>
                     </a:ext>
                   </a:extLst>
                 </p:cNvPr>
@@ -22327,7 +22327,7 @@
             <p:cNvPr id="4" name="Freeform: Shape 3">
               <a:extLst>
                 <a:ext uri="{FF2B5EF4-FFF2-40B4-BE49-F238E27FC236}">
-                  <a16:creationId xmlns:a16="http://schemas.microsoft.com/office/drawing/2014/main" xmlns="" id="{96F85BB2-FB72-4106-A80E-8EC54D4E390F}"/>
+                  <a16:creationId xmlns="" xmlns:a16="http://schemas.microsoft.com/office/drawing/2014/main" id="{96F85BB2-FB72-4106-A80E-8EC54D4E390F}"/>
                 </a:ext>
               </a:extLst>
             </p:cNvPr>
@@ -22918,7 +22918,7 @@
             <p:cNvPr id="96" name="Freeform: Shape 95">
               <a:extLst>
                 <a:ext uri="{FF2B5EF4-FFF2-40B4-BE49-F238E27FC236}">
-                  <a16:creationId xmlns:a16="http://schemas.microsoft.com/office/drawing/2014/main" xmlns="" id="{D28B84F7-E38C-4C45-97DF-B9E211E8B4F8}"/>
+                  <a16:creationId xmlns="" xmlns:a16="http://schemas.microsoft.com/office/drawing/2014/main" id="{D28B84F7-E38C-4C45-97DF-B9E211E8B4F8}"/>
                 </a:ext>
               </a:extLst>
             </p:cNvPr>
@@ -28003,7 +28003,7 @@
             <p:cNvPr id="91" name="Freeform: Shape 90">
               <a:extLst>
                 <a:ext uri="{FF2B5EF4-FFF2-40B4-BE49-F238E27FC236}">
-                  <a16:creationId xmlns:a16="http://schemas.microsoft.com/office/drawing/2014/main" xmlns="" id="{0583E431-7DD8-4474-A7EC-8E58A4178F20}"/>
+                  <a16:creationId xmlns="" xmlns:a16="http://schemas.microsoft.com/office/drawing/2014/main" id="{0583E431-7DD8-4474-A7EC-8E58A4178F20}"/>
                 </a:ext>
               </a:extLst>
             </p:cNvPr>
@@ -28111,7 +28111,7 @@
             <p:cNvPr id="95" name="Freeform: Shape 94">
               <a:extLst>
                 <a:ext uri="{FF2B5EF4-FFF2-40B4-BE49-F238E27FC236}">
-                  <a16:creationId xmlns:a16="http://schemas.microsoft.com/office/drawing/2014/main" xmlns="" id="{7F11E029-EE4E-47A8-A49D-2624DDFB95CC}"/>
+                  <a16:creationId xmlns="" xmlns:a16="http://schemas.microsoft.com/office/drawing/2014/main" id="{7F11E029-EE4E-47A8-A49D-2624DDFB95CC}"/>
                 </a:ext>
               </a:extLst>
             </p:cNvPr>
@@ -28386,7 +28386,7 @@
             <p:cNvPr id="97" name="Freeform: Shape 96">
               <a:extLst>
                 <a:ext uri="{FF2B5EF4-FFF2-40B4-BE49-F238E27FC236}">
-                  <a16:creationId xmlns:a16="http://schemas.microsoft.com/office/drawing/2014/main" xmlns="" id="{DF375085-4E9E-4CD4-B48E-19513A46CF85}"/>
+                  <a16:creationId xmlns="" xmlns:a16="http://schemas.microsoft.com/office/drawing/2014/main" id="{DF375085-4E9E-4CD4-B48E-19513A46CF85}"/>
                 </a:ext>
               </a:extLst>
             </p:cNvPr>
@@ -28658,7 +28658,7 @@
           <p:cNvPr id="2" name="Text Placeholder 1">
             <a:extLst>
               <a:ext uri="{FF2B5EF4-FFF2-40B4-BE49-F238E27FC236}">
-                <a16:creationId xmlns:a16="http://schemas.microsoft.com/office/drawing/2014/main" xmlns="" id="{D735F7F3-C1B5-4B60-A00A-4EB618DDFB5A}"/>
+                <a16:creationId xmlns="" xmlns:a16="http://schemas.microsoft.com/office/drawing/2014/main" id="{D735F7F3-C1B5-4B60-A00A-4EB618DDFB5A}"/>
               </a:ext>
             </a:extLst>
           </p:cNvPr>
@@ -29598,17 +29598,7 @@
                     <a:latin typeface="+mj-lt"/>
                     <a:ea typeface="Roboto Light" panose="02000000000000000000" pitchFamily="2" charset="0"/>
                   </a:rPr>
-                  <a:t>Bangalore </a:t>
-                </a:r>
-                <a:r>
-                  <a:rPr lang="en-US" sz="1600" b="1" dirty="0" smtClean="0">
-                    <a:solidFill>
-                      <a:schemeClr val="bg1"/>
-                    </a:solidFill>
-                    <a:latin typeface="+mj-lt"/>
-                    <a:ea typeface="Roboto Light" panose="02000000000000000000" pitchFamily="2" charset="0"/>
-                  </a:rPr>
-                  <a:t>Neighborhoods - EDA</a:t>
+                  <a:t>Bangalore Neighborhoods - EDA</a:t>
                 </a:r>
                 <a:endParaRPr lang="ru-RU" sz="1600" b="1" dirty="0">
                   <a:solidFill>
@@ -29814,7 +29804,7 @@
           <p:cNvPr id="2" name="Text Placeholder 1">
             <a:extLst>
               <a:ext uri="{FF2B5EF4-FFF2-40B4-BE49-F238E27FC236}">
-                <a16:creationId xmlns:a16="http://schemas.microsoft.com/office/drawing/2014/main" xmlns="" id="{D735F7F3-C1B5-4B60-A00A-4EB618DDFB5A}"/>
+                <a16:creationId xmlns="" xmlns:a16="http://schemas.microsoft.com/office/drawing/2014/main" id="{D735F7F3-C1B5-4B60-A00A-4EB618DDFB5A}"/>
               </a:ext>
             </a:extLst>
           </p:cNvPr>
@@ -30119,7 +30109,7 @@
         </p:blipFill>
         <p:spPr>
           <a:xfrm>
-            <a:off x="5932982" y="4897137"/>
+            <a:off x="4223243" y="4873324"/>
             <a:ext cx="1971675" cy="1514475"/>
           </a:xfrm>
           <a:prstGeom prst="rect">
@@ -30143,7 +30133,7 @@
         </p:blipFill>
         <p:spPr>
           <a:xfrm>
-            <a:off x="2979391" y="4897137"/>
+            <a:off x="1332082" y="4897137"/>
             <a:ext cx="1905000" cy="1466850"/>
           </a:xfrm>
           <a:prstGeom prst="rect">
@@ -30199,8 +30189,8 @@
         </p:nvSpPr>
         <p:spPr>
           <a:xfrm>
-            <a:off x="8097795" y="4736757"/>
-            <a:ext cx="634313" cy="1005016"/>
+            <a:off x="10320379" y="3690551"/>
+            <a:ext cx="1136822" cy="2537255"/>
           </a:xfrm>
           <a:prstGeom prst="curvedLeftArrow">
             <a:avLst/>
@@ -30243,7 +30233,7 @@
         </p:nvSpPr>
         <p:spPr>
           <a:xfrm>
-            <a:off x="4971534" y="5481979"/>
+            <a:off x="3323966" y="5463973"/>
             <a:ext cx="799071" cy="417682"/>
           </a:xfrm>
           <a:prstGeom prst="leftArrow">
@@ -30332,6 +30322,70 @@
               <a:t>Clusters</a:t>
             </a:r>
             <a:endParaRPr lang="en-US" dirty="0"/>
+          </a:p>
+        </p:txBody>
+      </p:sp>
+      <p:pic>
+        <p:nvPicPr>
+          <p:cNvPr id="12" name="Picture 11"/>
+          <p:cNvPicPr>
+            <a:picLocks noChangeAspect="1"/>
+          </p:cNvPicPr>
+          <p:nvPr/>
+        </p:nvPicPr>
+        <p:blipFill>
+          <a:blip r:embed="rId6"/>
+          <a:stretch>
+            <a:fillRect/>
+          </a:stretch>
+        </p:blipFill>
+        <p:spPr>
+          <a:xfrm>
+            <a:off x="7217537" y="4713353"/>
+            <a:ext cx="2896085" cy="1918922"/>
+          </a:xfrm>
+          <a:prstGeom prst="rect">
+            <a:avLst/>
+          </a:prstGeom>
+        </p:spPr>
+      </p:pic>
+      <p:sp>
+        <p:nvSpPr>
+          <p:cNvPr id="13" name="Left Arrow 12"/>
+          <p:cNvSpPr/>
+          <p:nvPr/>
+        </p:nvSpPr>
+        <p:spPr>
+          <a:xfrm>
+            <a:off x="6321375" y="5421720"/>
+            <a:ext cx="799071" cy="417682"/>
+          </a:xfrm>
+          <a:prstGeom prst="leftArrow">
+            <a:avLst/>
+          </a:prstGeom>
+        </p:spPr>
+        <p:style>
+          <a:lnRef idx="2">
+            <a:schemeClr val="accent1">
+              <a:shade val="50000"/>
+            </a:schemeClr>
+          </a:lnRef>
+          <a:fillRef idx="1">
+            <a:schemeClr val="accent1"/>
+          </a:fillRef>
+          <a:effectRef idx="0">
+            <a:schemeClr val="accent1"/>
+          </a:effectRef>
+          <a:fontRef idx="minor">
+            <a:schemeClr val="lt1"/>
+          </a:fontRef>
+        </p:style>
+        <p:txBody>
+          <a:bodyPr rtlCol="0" anchor="ctr"/>
+          <a:lstStyle/>
+          <a:p>
+            <a:pPr algn="ctr"/>
+            <a:endParaRPr lang="en-US"/>
           </a:p>
         </p:txBody>
       </p:sp>
@@ -30550,7 +30604,7 @@
           <p:cNvPr id="2" name="Text Placeholder 1">
             <a:extLst>
               <a:ext uri="{FF2B5EF4-FFF2-40B4-BE49-F238E27FC236}">
-                <a16:creationId xmlns:a16="http://schemas.microsoft.com/office/drawing/2014/main" xmlns="" id="{D735F7F3-C1B5-4B60-A00A-4EB618DDFB5A}"/>
+                <a16:creationId xmlns="" xmlns:a16="http://schemas.microsoft.com/office/drawing/2014/main" id="{D735F7F3-C1B5-4B60-A00A-4EB618DDFB5A}"/>
               </a:ext>
             </a:extLst>
           </p:cNvPr>

</xml_diff>